<commit_message>
Burndown & Velocity sprint 7
</commit_message>
<xml_diff>
--- a/Burndown & Velocity/V1.7.1 [2021-08-10] Burndown Velocity Sprint 1-6.pptx
+++ b/Burndown & Velocity/V1.7.1 [2021-08-10] Burndown Velocity Sprint 1-6.pptx
@@ -238,8 +238,21 @@
                   <a:schemeClr val="tx1"/>
                 </a:solidFill>
               </a:rPr>
-              <a:t>ที่ 4</a:t>
-            </a:r>
+              <a:t>ที่ </a:t>
+            </a:r>
+            <a:r>
+              <a:rPr lang="en-US" b="1" dirty="0">
+                <a:solidFill>
+                  <a:schemeClr val="tx1"/>
+                </a:solidFill>
+              </a:rPr>
+              <a:t>6</a:t>
+            </a:r>
+            <a:endParaRPr lang="th-TH" b="1" dirty="0">
+              <a:solidFill>
+                <a:schemeClr val="tx1"/>
+              </a:solidFill>
+            </a:endParaRPr>
           </a:p>
         </c:rich>
       </c:tx>
@@ -790,8 +803,21 @@
                   <a:schemeClr val="tx1"/>
                 </a:solidFill>
               </a:rPr>
-              <a:t>ที่ 4</a:t>
-            </a:r>
+              <a:t>ที่ </a:t>
+            </a:r>
+            <a:r>
+              <a:rPr lang="en-US" b="1" dirty="0">
+                <a:solidFill>
+                  <a:schemeClr val="tx1"/>
+                </a:solidFill>
+              </a:rPr>
+              <a:t>6</a:t>
+            </a:r>
+            <a:endParaRPr lang="th-TH" b="1" dirty="0">
+              <a:solidFill>
+                <a:schemeClr val="tx1"/>
+              </a:solidFill>
+            </a:endParaRPr>
           </a:p>
         </c:rich>
       </c:tx>
@@ -3055,7 +3081,7 @@
           <a:p>
             <a:fld id="{12C3E8BB-F70B-41C7-A2C4-69BE80B44BDC}" type="datetimeFigureOut">
               <a:rPr lang="th-TH" smtClean="0"/>
-              <a:t>10/08/64</a:t>
+              <a:t>17/08/64</a:t>
             </a:fld>
             <a:endParaRPr lang="th-TH"/>
           </a:p>
@@ -3253,7 +3279,7 @@
           <a:p>
             <a:fld id="{12C3E8BB-F70B-41C7-A2C4-69BE80B44BDC}" type="datetimeFigureOut">
               <a:rPr lang="th-TH" smtClean="0"/>
-              <a:t>10/08/64</a:t>
+              <a:t>17/08/64</a:t>
             </a:fld>
             <a:endParaRPr lang="th-TH"/>
           </a:p>
@@ -3461,7 +3487,7 @@
           <a:p>
             <a:fld id="{12C3E8BB-F70B-41C7-A2C4-69BE80B44BDC}" type="datetimeFigureOut">
               <a:rPr lang="th-TH" smtClean="0"/>
-              <a:t>10/08/64</a:t>
+              <a:t>17/08/64</a:t>
             </a:fld>
             <a:endParaRPr lang="th-TH"/>
           </a:p>
@@ -3659,7 +3685,7 @@
           <a:p>
             <a:fld id="{12C3E8BB-F70B-41C7-A2C4-69BE80B44BDC}" type="datetimeFigureOut">
               <a:rPr lang="th-TH" smtClean="0"/>
-              <a:t>10/08/64</a:t>
+              <a:t>17/08/64</a:t>
             </a:fld>
             <a:endParaRPr lang="th-TH"/>
           </a:p>
@@ -3934,7 +3960,7 @@
           <a:p>
             <a:fld id="{12C3E8BB-F70B-41C7-A2C4-69BE80B44BDC}" type="datetimeFigureOut">
               <a:rPr lang="th-TH" smtClean="0"/>
-              <a:t>10/08/64</a:t>
+              <a:t>17/08/64</a:t>
             </a:fld>
             <a:endParaRPr lang="th-TH"/>
           </a:p>
@@ -4199,7 +4225,7 @@
           <a:p>
             <a:fld id="{12C3E8BB-F70B-41C7-A2C4-69BE80B44BDC}" type="datetimeFigureOut">
               <a:rPr lang="th-TH" smtClean="0"/>
-              <a:t>10/08/64</a:t>
+              <a:t>17/08/64</a:t>
             </a:fld>
             <a:endParaRPr lang="th-TH"/>
           </a:p>
@@ -4611,7 +4637,7 @@
           <a:p>
             <a:fld id="{12C3E8BB-F70B-41C7-A2C4-69BE80B44BDC}" type="datetimeFigureOut">
               <a:rPr lang="th-TH" smtClean="0"/>
-              <a:t>10/08/64</a:t>
+              <a:t>17/08/64</a:t>
             </a:fld>
             <a:endParaRPr lang="th-TH"/>
           </a:p>
@@ -4752,7 +4778,7 @@
           <a:p>
             <a:fld id="{12C3E8BB-F70B-41C7-A2C4-69BE80B44BDC}" type="datetimeFigureOut">
               <a:rPr lang="th-TH" smtClean="0"/>
-              <a:t>10/08/64</a:t>
+              <a:t>17/08/64</a:t>
             </a:fld>
             <a:endParaRPr lang="th-TH"/>
           </a:p>
@@ -4865,7 +4891,7 @@
           <a:p>
             <a:fld id="{12C3E8BB-F70B-41C7-A2C4-69BE80B44BDC}" type="datetimeFigureOut">
               <a:rPr lang="th-TH" smtClean="0"/>
-              <a:t>10/08/64</a:t>
+              <a:t>17/08/64</a:t>
             </a:fld>
             <a:endParaRPr lang="th-TH"/>
           </a:p>
@@ -5176,7 +5202,7 @@
           <a:p>
             <a:fld id="{12C3E8BB-F70B-41C7-A2C4-69BE80B44BDC}" type="datetimeFigureOut">
               <a:rPr lang="th-TH" smtClean="0"/>
-              <a:t>10/08/64</a:t>
+              <a:t>17/08/64</a:t>
             </a:fld>
             <a:endParaRPr lang="th-TH"/>
           </a:p>
@@ -5464,7 +5490,7 @@
           <a:p>
             <a:fld id="{12C3E8BB-F70B-41C7-A2C4-69BE80B44BDC}" type="datetimeFigureOut">
               <a:rPr lang="th-TH" smtClean="0"/>
-              <a:t>10/08/64</a:t>
+              <a:t>17/08/64</a:t>
             </a:fld>
             <a:endParaRPr lang="th-TH"/>
           </a:p>
@@ -5705,7 +5731,7 @@
           <a:p>
             <a:fld id="{12C3E8BB-F70B-41C7-A2C4-69BE80B44BDC}" type="datetimeFigureOut">
               <a:rPr lang="th-TH" smtClean="0"/>
-              <a:t>10/08/64</a:t>
+              <a:t>17/08/64</a:t>
             </a:fld>
             <a:endParaRPr lang="th-TH"/>
           </a:p>
@@ -6135,7 +6161,7 @@
           <p:nvPr>
             <p:extLst>
               <p:ext uri="{D42A27DB-BD31-4B8C-83A1-F6EECF244321}">
-                <p14:modId xmlns:p14="http://schemas.microsoft.com/office/powerpoint/2010/main" val="3162753128"/>
+                <p14:modId xmlns:p14="http://schemas.microsoft.com/office/powerpoint/2010/main" val="3695700383"/>
               </p:ext>
             </p:extLst>
           </p:nvPr>
@@ -7059,7 +7085,7 @@
           <p:nvPr>
             <p:extLst>
               <p:ext uri="{D42A27DB-BD31-4B8C-83A1-F6EECF244321}">
-                <p14:modId xmlns:p14="http://schemas.microsoft.com/office/powerpoint/2010/main" val="3247274071"/>
+                <p14:modId xmlns:p14="http://schemas.microsoft.com/office/powerpoint/2010/main" val="4008691787"/>
               </p:ext>
             </p:extLst>
           </p:nvPr>

</xml_diff>